<commit_message>
tests conversion json to ppt
</commit_message>
<xml_diff>
--- a/python-pptx/slide_layouts_placeholders.pptx
+++ b/python-pptx/slide_layouts_placeholders.pptx
@@ -5,17 +5,17 @@
     <p:sldMasterId id="2147483648" r:id="rId1"/>
   </p:sldMasterIdLst>
   <p:sldIdLst>
-    <p:sldId id="256" r:id="rId7"/>
-    <p:sldId id="257" r:id="rId8"/>
-    <p:sldId id="258" r:id="rId9"/>
-    <p:sldId id="259" r:id="rId10"/>
-    <p:sldId id="260" r:id="rId11"/>
-    <p:sldId id="261" r:id="rId12"/>
-    <p:sldId id="262" r:id="rId13"/>
-    <p:sldId id="263" r:id="rId14"/>
-    <p:sldId id="264" r:id="rId15"/>
-    <p:sldId id="265" r:id="rId16"/>
-    <p:sldId id="266" r:id="rId17"/>
+    <p:sldId id="256" r:id="rId2"/>
+    <p:sldId id="257" r:id="rId3"/>
+    <p:sldId id="258" r:id="rId4"/>
+    <p:sldId id="259" r:id="rId5"/>
+    <p:sldId id="260" r:id="rId6"/>
+    <p:sldId id="261" r:id="rId7"/>
+    <p:sldId id="262" r:id="rId8"/>
+    <p:sldId id="263" r:id="rId9"/>
+    <p:sldId id="264" r:id="rId10"/>
+    <p:sldId id="265" r:id="rId11"/>
+    <p:sldId id="266" r:id="rId12"/>
   </p:sldIdLst>
   <p:sldSz cx="9144000" cy="6858000" type="screen4x3"/>
   <p:notesSz cx="6858000" cy="9144000"/>
@@ -114,7 +114,44 @@
       </a:defRPr>
     </a:lvl9pPr>
   </p:defaultTextStyle>
+  <p:extLst>
+    <p:ext uri="{EFAFB233-063F-42B5-8137-9DF3F51BA10A}">
+      <p15:sldGuideLst xmlns:p15="http://schemas.microsoft.com/office/powerpoint/2012/main">
+        <p15:guide id="1" orient="horz" pos="2160">
+          <p15:clr>
+            <a:srgbClr val="A4A3A4"/>
+          </p15:clr>
+        </p15:guide>
+        <p15:guide id="2" pos="2880">
+          <p15:clr>
+            <a:srgbClr val="A4A3A4"/>
+          </p15:clr>
+        </p15:guide>
+      </p15:sldGuideLst>
+    </p:ext>
+  </p:extLst>
 </p:presentation>
+</file>
+
+<file path=ppt/changesInfos/changesInfo1.xml><?xml version="1.0" encoding="utf-8"?>
+<pc:chgInfo xmlns:a="http://schemas.openxmlformats.org/drawingml/2006/main" xmlns:r="http://schemas.openxmlformats.org/officeDocument/2006/relationships" xmlns:ac="http://schemas.microsoft.com/office/drawing/2013/main/command" xmlns:pc="http://schemas.microsoft.com/office/powerpoint/2013/main/command">
+  <pc:docChgLst>
+    <pc:chgData name="Jérémy TRULLIER" userId="6a7aa6db-e2f0-41b5-b206-e3597263f90b" providerId="ADAL" clId="{8D72BB26-AAAE-4C26-8995-4C4965390076}"/>
+    <pc:docChg chg="undo custSel addSld delSld">
+      <pc:chgData name="Jérémy TRULLIER" userId="6a7aa6db-e2f0-41b5-b206-e3597263f90b" providerId="ADAL" clId="{8D72BB26-AAAE-4C26-8995-4C4965390076}" dt="2020-11-27T13:11:24.108" v="1" actId="680"/>
+      <pc:docMkLst>
+        <pc:docMk/>
+      </pc:docMkLst>
+      <pc:sldChg chg="new del">
+        <pc:chgData name="Jérémy TRULLIER" userId="6a7aa6db-e2f0-41b5-b206-e3597263f90b" providerId="ADAL" clId="{8D72BB26-AAAE-4C26-8995-4C4965390076}" dt="2020-11-27T13:11:24.108" v="1" actId="680"/>
+        <pc:sldMkLst>
+          <pc:docMk/>
+          <pc:sldMk cId="185855248" sldId="267"/>
+        </pc:sldMkLst>
+      </pc:sldChg>
+    </pc:docChg>
+  </pc:docChgLst>
+</pc:chgInfo>
 </file>
 
 <file path=ppt/slideLayouts/slideLayout1.xml><?xml version="1.0" encoding="utf-8"?>
@@ -155,10 +192,9 @@
           <a:lstStyle/>
           <a:p>
             <a:r>
-              <a:rPr lang="en-US" smtClean="0"/>
+              <a:rPr lang="en-US"/>
               <a:t>Click to edit Master title style</a:t>
             </a:r>
-            <a:endParaRPr lang="en-US"/>
           </a:p>
         </p:txBody>
       </p:sp>
@@ -274,10 +310,9 @@
           </a:lstStyle>
           <a:p>
             <a:r>
-              <a:rPr lang="en-US" smtClean="0"/>
+              <a:rPr lang="en-US"/>
               <a:t>Click to edit Master subtitle style</a:t>
             </a:r>
-            <a:endParaRPr lang="en-US"/>
           </a:p>
         </p:txBody>
       </p:sp>
@@ -298,7 +333,7 @@
           <a:p>
             <a:fld id="{5BCAD085-E8A6-8845-BD4E-CB4CCA059FC4}" type="datetimeFigureOut">
               <a:rPr lang="en-US" smtClean="0"/>
-              <a:t>1/27/13</a:t>
+              <a:t>11/27/2020</a:t>
             </a:fld>
             <a:endParaRPr lang="en-US"/>
           </a:p>
@@ -340,7 +375,7 @@
           <a:p>
             <a:fld id="{C1FF6DA9-008F-8B48-92A6-B652298478BF}" type="slidenum">
               <a:rPr lang="en-US" smtClean="0"/>
-              <a:t>‹#›</a:t>
+              <a:t>‹N°›</a:t>
             </a:fld>
             <a:endParaRPr lang="en-US"/>
           </a:p>
@@ -392,10 +427,9 @@
           <a:lstStyle/>
           <a:p>
             <a:r>
-              <a:rPr lang="en-US" smtClean="0"/>
+              <a:rPr lang="en-US"/>
               <a:t>Click to edit Master title style</a:t>
             </a:r>
-            <a:endParaRPr lang="en-US"/>
           </a:p>
         </p:txBody>
       </p:sp>
@@ -416,38 +450,37 @@
           <a:p>
             <a:pPr lvl="0"/>
             <a:r>
-              <a:rPr lang="en-US" smtClean="0"/>
+              <a:rPr lang="en-US"/>
               <a:t>Click to edit Master text styles</a:t>
             </a:r>
           </a:p>
           <a:p>
             <a:pPr lvl="1"/>
             <a:r>
-              <a:rPr lang="en-US" smtClean="0"/>
+              <a:rPr lang="en-US"/>
               <a:t>Second level</a:t>
             </a:r>
           </a:p>
           <a:p>
             <a:pPr lvl="2"/>
             <a:r>
-              <a:rPr lang="en-US" smtClean="0"/>
+              <a:rPr lang="en-US"/>
               <a:t>Third level</a:t>
             </a:r>
           </a:p>
           <a:p>
             <a:pPr lvl="3"/>
             <a:r>
-              <a:rPr lang="en-US" smtClean="0"/>
+              <a:rPr lang="en-US"/>
               <a:t>Fourth level</a:t>
             </a:r>
           </a:p>
           <a:p>
             <a:pPr lvl="4"/>
             <a:r>
-              <a:rPr lang="en-US" smtClean="0"/>
+              <a:rPr lang="en-US"/>
               <a:t>Fifth level</a:t>
             </a:r>
-            <a:endParaRPr lang="en-US"/>
           </a:p>
         </p:txBody>
       </p:sp>
@@ -468,7 +501,7 @@
           <a:p>
             <a:fld id="{5BCAD085-E8A6-8845-BD4E-CB4CCA059FC4}" type="datetimeFigureOut">
               <a:rPr lang="en-US" smtClean="0"/>
-              <a:t>1/27/13</a:t>
+              <a:t>11/27/2020</a:t>
             </a:fld>
             <a:endParaRPr lang="en-US"/>
           </a:p>
@@ -510,7 +543,7 @@
           <a:p>
             <a:fld id="{C1FF6DA9-008F-8B48-92A6-B652298478BF}" type="slidenum">
               <a:rPr lang="en-US" smtClean="0"/>
-              <a:t>‹#›</a:t>
+              <a:t>‹N°›</a:t>
             </a:fld>
             <a:endParaRPr lang="en-US"/>
           </a:p>
@@ -567,10 +600,9 @@
           <a:lstStyle/>
           <a:p>
             <a:r>
-              <a:rPr lang="en-US" smtClean="0"/>
+              <a:rPr lang="en-US"/>
               <a:t>Click to edit Master title style</a:t>
             </a:r>
-            <a:endParaRPr lang="en-US"/>
           </a:p>
         </p:txBody>
       </p:sp>
@@ -596,38 +628,37 @@
           <a:p>
             <a:pPr lvl="0"/>
             <a:r>
-              <a:rPr lang="en-US" smtClean="0"/>
+              <a:rPr lang="en-US"/>
               <a:t>Click to edit Master text styles</a:t>
             </a:r>
           </a:p>
           <a:p>
             <a:pPr lvl="1"/>
             <a:r>
-              <a:rPr lang="en-US" smtClean="0"/>
+              <a:rPr lang="en-US"/>
               <a:t>Second level</a:t>
             </a:r>
           </a:p>
           <a:p>
             <a:pPr lvl="2"/>
             <a:r>
-              <a:rPr lang="en-US" smtClean="0"/>
+              <a:rPr lang="en-US"/>
               <a:t>Third level</a:t>
             </a:r>
           </a:p>
           <a:p>
             <a:pPr lvl="3"/>
             <a:r>
-              <a:rPr lang="en-US" smtClean="0"/>
+              <a:rPr lang="en-US"/>
               <a:t>Fourth level</a:t>
             </a:r>
           </a:p>
           <a:p>
             <a:pPr lvl="4"/>
             <a:r>
-              <a:rPr lang="en-US" smtClean="0"/>
+              <a:rPr lang="en-US"/>
               <a:t>Fifth level</a:t>
             </a:r>
-            <a:endParaRPr lang="en-US"/>
           </a:p>
         </p:txBody>
       </p:sp>
@@ -648,7 +679,7 @@
           <a:p>
             <a:fld id="{5BCAD085-E8A6-8845-BD4E-CB4CCA059FC4}" type="datetimeFigureOut">
               <a:rPr lang="en-US" smtClean="0"/>
-              <a:t>1/27/13</a:t>
+              <a:t>11/27/2020</a:t>
             </a:fld>
             <a:endParaRPr lang="en-US"/>
           </a:p>
@@ -690,7 +721,7 @@
           <a:p>
             <a:fld id="{C1FF6DA9-008F-8B48-92A6-B652298478BF}" type="slidenum">
               <a:rPr lang="en-US" smtClean="0"/>
-              <a:t>‹#›</a:t>
+              <a:t>‹N°›</a:t>
             </a:fld>
             <a:endParaRPr lang="en-US"/>
           </a:p>
@@ -742,10 +773,9 @@
           <a:lstStyle/>
           <a:p>
             <a:r>
-              <a:rPr lang="en-US" smtClean="0"/>
+              <a:rPr lang="en-US"/>
               <a:t>Click to edit Master title style</a:t>
             </a:r>
-            <a:endParaRPr lang="en-US"/>
           </a:p>
         </p:txBody>
       </p:sp>
@@ -766,38 +796,37 @@
           <a:p>
             <a:pPr lvl="0"/>
             <a:r>
-              <a:rPr lang="en-US" smtClean="0"/>
+              <a:rPr lang="en-US"/>
               <a:t>Click to edit Master text styles</a:t>
             </a:r>
           </a:p>
           <a:p>
             <a:pPr lvl="1"/>
             <a:r>
-              <a:rPr lang="en-US" smtClean="0"/>
+              <a:rPr lang="en-US"/>
               <a:t>Second level</a:t>
             </a:r>
           </a:p>
           <a:p>
             <a:pPr lvl="2"/>
             <a:r>
-              <a:rPr lang="en-US" smtClean="0"/>
+              <a:rPr lang="en-US"/>
               <a:t>Third level</a:t>
             </a:r>
           </a:p>
           <a:p>
             <a:pPr lvl="3"/>
             <a:r>
-              <a:rPr lang="en-US" smtClean="0"/>
+              <a:rPr lang="en-US"/>
               <a:t>Fourth level</a:t>
             </a:r>
           </a:p>
           <a:p>
             <a:pPr lvl="4"/>
             <a:r>
-              <a:rPr lang="en-US" smtClean="0"/>
+              <a:rPr lang="en-US"/>
               <a:t>Fifth level</a:t>
             </a:r>
-            <a:endParaRPr lang="en-US"/>
           </a:p>
         </p:txBody>
       </p:sp>
@@ -818,7 +847,7 @@
           <a:p>
             <a:fld id="{5BCAD085-E8A6-8845-BD4E-CB4CCA059FC4}" type="datetimeFigureOut">
               <a:rPr lang="en-US" smtClean="0"/>
-              <a:t>1/27/13</a:t>
+              <a:t>11/27/2020</a:t>
             </a:fld>
             <a:endParaRPr lang="en-US"/>
           </a:p>
@@ -860,7 +889,7 @@
           <a:p>
             <a:fld id="{C1FF6DA9-008F-8B48-92A6-B652298478BF}" type="slidenum">
               <a:rPr lang="en-US" smtClean="0"/>
-              <a:t>‹#›</a:t>
+              <a:t>‹N°›</a:t>
             </a:fld>
             <a:endParaRPr lang="en-US"/>
           </a:p>
@@ -921,10 +950,9 @@
           </a:lstStyle>
           <a:p>
             <a:r>
-              <a:rPr lang="en-US" smtClean="0"/>
+              <a:rPr lang="en-US"/>
               <a:t>Click to edit Master title style</a:t>
             </a:r>
-            <a:endParaRPr lang="en-US"/>
           </a:p>
         </p:txBody>
       </p:sp>
@@ -1041,7 +1069,7 @@
           <a:p>
             <a:pPr lvl="0"/>
             <a:r>
-              <a:rPr lang="en-US" smtClean="0"/>
+              <a:rPr lang="en-US"/>
               <a:t>Click to edit Master text styles</a:t>
             </a:r>
           </a:p>
@@ -1064,7 +1092,7 @@
           <a:p>
             <a:fld id="{5BCAD085-E8A6-8845-BD4E-CB4CCA059FC4}" type="datetimeFigureOut">
               <a:rPr lang="en-US" smtClean="0"/>
-              <a:t>1/27/13</a:t>
+              <a:t>11/27/2020</a:t>
             </a:fld>
             <a:endParaRPr lang="en-US"/>
           </a:p>
@@ -1106,7 +1134,7 @@
           <a:p>
             <a:fld id="{C1FF6DA9-008F-8B48-92A6-B652298478BF}" type="slidenum">
               <a:rPr lang="en-US" smtClean="0"/>
-              <a:t>‹#›</a:t>
+              <a:t>‹N°›</a:t>
             </a:fld>
             <a:endParaRPr lang="en-US"/>
           </a:p>
@@ -1158,10 +1186,9 @@
           <a:lstStyle/>
           <a:p>
             <a:r>
-              <a:rPr lang="en-US" smtClean="0"/>
+              <a:rPr lang="en-US"/>
               <a:t>Click to edit Master title style</a:t>
             </a:r>
-            <a:endParaRPr lang="en-US"/>
           </a:p>
         </p:txBody>
       </p:sp>
@@ -1215,38 +1242,37 @@
           <a:p>
             <a:pPr lvl="0"/>
             <a:r>
-              <a:rPr lang="en-US" smtClean="0"/>
+              <a:rPr lang="en-US"/>
               <a:t>Click to edit Master text styles</a:t>
             </a:r>
           </a:p>
           <a:p>
             <a:pPr lvl="1"/>
             <a:r>
-              <a:rPr lang="en-US" smtClean="0"/>
+              <a:rPr lang="en-US"/>
               <a:t>Second level</a:t>
             </a:r>
           </a:p>
           <a:p>
             <a:pPr lvl="2"/>
             <a:r>
-              <a:rPr lang="en-US" smtClean="0"/>
+              <a:rPr lang="en-US"/>
               <a:t>Third level</a:t>
             </a:r>
           </a:p>
           <a:p>
             <a:pPr lvl="3"/>
             <a:r>
-              <a:rPr lang="en-US" smtClean="0"/>
+              <a:rPr lang="en-US"/>
               <a:t>Fourth level</a:t>
             </a:r>
           </a:p>
           <a:p>
             <a:pPr lvl="4"/>
             <a:r>
-              <a:rPr lang="en-US" smtClean="0"/>
+              <a:rPr lang="en-US"/>
               <a:t>Fifth level</a:t>
             </a:r>
-            <a:endParaRPr lang="en-US"/>
           </a:p>
         </p:txBody>
       </p:sp>
@@ -1300,38 +1326,37 @@
           <a:p>
             <a:pPr lvl="0"/>
             <a:r>
-              <a:rPr lang="en-US" smtClean="0"/>
+              <a:rPr lang="en-US"/>
               <a:t>Click to edit Master text styles</a:t>
             </a:r>
           </a:p>
           <a:p>
             <a:pPr lvl="1"/>
             <a:r>
-              <a:rPr lang="en-US" smtClean="0"/>
+              <a:rPr lang="en-US"/>
               <a:t>Second level</a:t>
             </a:r>
           </a:p>
           <a:p>
             <a:pPr lvl="2"/>
             <a:r>
-              <a:rPr lang="en-US" smtClean="0"/>
+              <a:rPr lang="en-US"/>
               <a:t>Third level</a:t>
             </a:r>
           </a:p>
           <a:p>
             <a:pPr lvl="3"/>
             <a:r>
-              <a:rPr lang="en-US" smtClean="0"/>
+              <a:rPr lang="en-US"/>
               <a:t>Fourth level</a:t>
             </a:r>
           </a:p>
           <a:p>
             <a:pPr lvl="4"/>
             <a:r>
-              <a:rPr lang="en-US" smtClean="0"/>
+              <a:rPr lang="en-US"/>
               <a:t>Fifth level</a:t>
             </a:r>
-            <a:endParaRPr lang="en-US"/>
           </a:p>
         </p:txBody>
       </p:sp>
@@ -1352,7 +1377,7 @@
           <a:p>
             <a:fld id="{5BCAD085-E8A6-8845-BD4E-CB4CCA059FC4}" type="datetimeFigureOut">
               <a:rPr lang="en-US" smtClean="0"/>
-              <a:t>1/27/13</a:t>
+              <a:t>11/27/2020</a:t>
             </a:fld>
             <a:endParaRPr lang="en-US"/>
           </a:p>
@@ -1394,7 +1419,7 @@
           <a:p>
             <a:fld id="{C1FF6DA9-008F-8B48-92A6-B652298478BF}" type="slidenum">
               <a:rPr lang="en-US" smtClean="0"/>
-              <a:t>‹#›</a:t>
+              <a:t>‹N°›</a:t>
             </a:fld>
             <a:endParaRPr lang="en-US"/>
           </a:p>
@@ -1450,10 +1475,9 @@
           </a:lstStyle>
           <a:p>
             <a:r>
-              <a:rPr lang="en-US" smtClean="0"/>
+              <a:rPr lang="en-US"/>
               <a:t>Click to edit Master title style</a:t>
             </a:r>
-            <a:endParaRPr lang="en-US"/>
           </a:p>
         </p:txBody>
       </p:sp>
@@ -1516,7 +1540,7 @@
           <a:p>
             <a:pPr lvl="0"/>
             <a:r>
-              <a:rPr lang="en-US" smtClean="0"/>
+              <a:rPr lang="en-US"/>
               <a:t>Click to edit Master text styles</a:t>
             </a:r>
           </a:p>
@@ -1572,38 +1596,37 @@
           <a:p>
             <a:pPr lvl="0"/>
             <a:r>
-              <a:rPr lang="en-US" smtClean="0"/>
+              <a:rPr lang="en-US"/>
               <a:t>Click to edit Master text styles</a:t>
             </a:r>
           </a:p>
           <a:p>
             <a:pPr lvl="1"/>
             <a:r>
-              <a:rPr lang="en-US" smtClean="0"/>
+              <a:rPr lang="en-US"/>
               <a:t>Second level</a:t>
             </a:r>
           </a:p>
           <a:p>
             <a:pPr lvl="2"/>
             <a:r>
-              <a:rPr lang="en-US" smtClean="0"/>
+              <a:rPr lang="en-US"/>
               <a:t>Third level</a:t>
             </a:r>
           </a:p>
           <a:p>
             <a:pPr lvl="3"/>
             <a:r>
-              <a:rPr lang="en-US" smtClean="0"/>
+              <a:rPr lang="en-US"/>
               <a:t>Fourth level</a:t>
             </a:r>
           </a:p>
           <a:p>
             <a:pPr lvl="4"/>
             <a:r>
-              <a:rPr lang="en-US" smtClean="0"/>
+              <a:rPr lang="en-US"/>
               <a:t>Fifth level</a:t>
             </a:r>
-            <a:endParaRPr lang="en-US"/>
           </a:p>
         </p:txBody>
       </p:sp>
@@ -1666,7 +1689,7 @@
           <a:p>
             <a:pPr lvl="0"/>
             <a:r>
-              <a:rPr lang="en-US" smtClean="0"/>
+              <a:rPr lang="en-US"/>
               <a:t>Click to edit Master text styles</a:t>
             </a:r>
           </a:p>
@@ -1722,38 +1745,37 @@
           <a:p>
             <a:pPr lvl="0"/>
             <a:r>
-              <a:rPr lang="en-US" smtClean="0"/>
+              <a:rPr lang="en-US"/>
               <a:t>Click to edit Master text styles</a:t>
             </a:r>
           </a:p>
           <a:p>
             <a:pPr lvl="1"/>
             <a:r>
-              <a:rPr lang="en-US" smtClean="0"/>
+              <a:rPr lang="en-US"/>
               <a:t>Second level</a:t>
             </a:r>
           </a:p>
           <a:p>
             <a:pPr lvl="2"/>
             <a:r>
-              <a:rPr lang="en-US" smtClean="0"/>
+              <a:rPr lang="en-US"/>
               <a:t>Third level</a:t>
             </a:r>
           </a:p>
           <a:p>
             <a:pPr lvl="3"/>
             <a:r>
-              <a:rPr lang="en-US" smtClean="0"/>
+              <a:rPr lang="en-US"/>
               <a:t>Fourth level</a:t>
             </a:r>
           </a:p>
           <a:p>
             <a:pPr lvl="4"/>
             <a:r>
-              <a:rPr lang="en-US" smtClean="0"/>
+              <a:rPr lang="en-US"/>
               <a:t>Fifth level</a:t>
             </a:r>
-            <a:endParaRPr lang="en-US"/>
           </a:p>
         </p:txBody>
       </p:sp>
@@ -1774,7 +1796,7 @@
           <a:p>
             <a:fld id="{5BCAD085-E8A6-8845-BD4E-CB4CCA059FC4}" type="datetimeFigureOut">
               <a:rPr lang="en-US" smtClean="0"/>
-              <a:t>1/27/13</a:t>
+              <a:t>11/27/2020</a:t>
             </a:fld>
             <a:endParaRPr lang="en-US"/>
           </a:p>
@@ -1816,7 +1838,7 @@
           <a:p>
             <a:fld id="{C1FF6DA9-008F-8B48-92A6-B652298478BF}" type="slidenum">
               <a:rPr lang="en-US" smtClean="0"/>
-              <a:t>‹#›</a:t>
+              <a:t>‹N°›</a:t>
             </a:fld>
             <a:endParaRPr lang="en-US"/>
           </a:p>
@@ -1868,10 +1890,9 @@
           <a:lstStyle/>
           <a:p>
             <a:r>
-              <a:rPr lang="en-US" smtClean="0"/>
+              <a:rPr lang="en-US"/>
               <a:t>Click to edit Master title style</a:t>
             </a:r>
-            <a:endParaRPr lang="en-US"/>
           </a:p>
         </p:txBody>
       </p:sp>
@@ -1892,7 +1913,7 @@
           <a:p>
             <a:fld id="{5BCAD085-E8A6-8845-BD4E-CB4CCA059FC4}" type="datetimeFigureOut">
               <a:rPr lang="en-US" smtClean="0"/>
-              <a:t>1/27/13</a:t>
+              <a:t>11/27/2020</a:t>
             </a:fld>
             <a:endParaRPr lang="en-US"/>
           </a:p>
@@ -1934,7 +1955,7 @@
           <a:p>
             <a:fld id="{C1FF6DA9-008F-8B48-92A6-B652298478BF}" type="slidenum">
               <a:rPr lang="en-US" smtClean="0"/>
-              <a:t>‹#›</a:t>
+              <a:t>‹N°›</a:t>
             </a:fld>
             <a:endParaRPr lang="en-US"/>
           </a:p>
@@ -1987,7 +2008,7 @@
           <a:p>
             <a:fld id="{5BCAD085-E8A6-8845-BD4E-CB4CCA059FC4}" type="datetimeFigureOut">
               <a:rPr lang="en-US" smtClean="0"/>
-              <a:t>1/27/13</a:t>
+              <a:t>11/27/2020</a:t>
             </a:fld>
             <a:endParaRPr lang="en-US"/>
           </a:p>
@@ -2029,7 +2050,7 @@
           <a:p>
             <a:fld id="{C1FF6DA9-008F-8B48-92A6-B652298478BF}" type="slidenum">
               <a:rPr lang="en-US" smtClean="0"/>
-              <a:t>‹#›</a:t>
+              <a:t>‹N°›</a:t>
             </a:fld>
             <a:endParaRPr lang="en-US"/>
           </a:p>
@@ -2090,10 +2111,9 @@
           </a:lstStyle>
           <a:p>
             <a:r>
-              <a:rPr lang="en-US" smtClean="0"/>
+              <a:rPr lang="en-US"/>
               <a:t>Click to edit Master title style</a:t>
             </a:r>
-            <a:endParaRPr lang="en-US"/>
           </a:p>
         </p:txBody>
       </p:sp>
@@ -2147,38 +2167,37 @@
           <a:p>
             <a:pPr lvl="0"/>
             <a:r>
-              <a:rPr lang="en-US" smtClean="0"/>
+              <a:rPr lang="en-US"/>
               <a:t>Click to edit Master text styles</a:t>
             </a:r>
           </a:p>
           <a:p>
             <a:pPr lvl="1"/>
             <a:r>
-              <a:rPr lang="en-US" smtClean="0"/>
+              <a:rPr lang="en-US"/>
               <a:t>Second level</a:t>
             </a:r>
           </a:p>
           <a:p>
             <a:pPr lvl="2"/>
             <a:r>
-              <a:rPr lang="en-US" smtClean="0"/>
+              <a:rPr lang="en-US"/>
               <a:t>Third level</a:t>
             </a:r>
           </a:p>
           <a:p>
             <a:pPr lvl="3"/>
             <a:r>
-              <a:rPr lang="en-US" smtClean="0"/>
+              <a:rPr lang="en-US"/>
               <a:t>Fourth level</a:t>
             </a:r>
           </a:p>
           <a:p>
             <a:pPr lvl="4"/>
             <a:r>
-              <a:rPr lang="en-US" smtClean="0"/>
+              <a:rPr lang="en-US"/>
               <a:t>Fifth level</a:t>
             </a:r>
-            <a:endParaRPr lang="en-US"/>
           </a:p>
         </p:txBody>
       </p:sp>
@@ -2241,7 +2260,7 @@
           <a:p>
             <a:pPr lvl="0"/>
             <a:r>
-              <a:rPr lang="en-US" smtClean="0"/>
+              <a:rPr lang="en-US"/>
               <a:t>Click to edit Master text styles</a:t>
             </a:r>
           </a:p>
@@ -2264,7 +2283,7 @@
           <a:p>
             <a:fld id="{5BCAD085-E8A6-8845-BD4E-CB4CCA059FC4}" type="datetimeFigureOut">
               <a:rPr lang="en-US" smtClean="0"/>
-              <a:t>1/27/13</a:t>
+              <a:t>11/27/2020</a:t>
             </a:fld>
             <a:endParaRPr lang="en-US"/>
           </a:p>
@@ -2306,7 +2325,7 @@
           <a:p>
             <a:fld id="{C1FF6DA9-008F-8B48-92A6-B652298478BF}" type="slidenum">
               <a:rPr lang="en-US" smtClean="0"/>
-              <a:t>‹#›</a:t>
+              <a:t>‹N°›</a:t>
             </a:fld>
             <a:endParaRPr lang="en-US"/>
           </a:p>
@@ -2367,10 +2386,9 @@
           </a:lstStyle>
           <a:p>
             <a:r>
-              <a:rPr lang="en-US" smtClean="0"/>
+              <a:rPr lang="en-US"/>
               <a:t>Click to edit Master title style</a:t>
             </a:r>
-            <a:endParaRPr lang="en-US"/>
           </a:p>
         </p:txBody>
       </p:sp>
@@ -2494,7 +2512,7 @@
           <a:p>
             <a:pPr lvl="0"/>
             <a:r>
-              <a:rPr lang="en-US" smtClean="0"/>
+              <a:rPr lang="en-US"/>
               <a:t>Click to edit Master text styles</a:t>
             </a:r>
           </a:p>
@@ -2517,7 +2535,7 @@
           <a:p>
             <a:fld id="{5BCAD085-E8A6-8845-BD4E-CB4CCA059FC4}" type="datetimeFigureOut">
               <a:rPr lang="en-US" smtClean="0"/>
-              <a:t>1/27/13</a:t>
+              <a:t>11/27/2020</a:t>
             </a:fld>
             <a:endParaRPr lang="en-US"/>
           </a:p>
@@ -2559,7 +2577,7 @@
           <a:p>
             <a:fld id="{C1FF6DA9-008F-8B48-92A6-B652298478BF}" type="slidenum">
               <a:rPr lang="en-US" smtClean="0"/>
-              <a:t>‹#›</a:t>
+              <a:t>‹N°›</a:t>
             </a:fld>
             <a:endParaRPr lang="en-US"/>
           </a:p>
@@ -2626,10 +2644,9 @@
           <a:lstStyle/>
           <a:p>
             <a:r>
-              <a:rPr lang="en-US" smtClean="0"/>
+              <a:rPr lang="en-US"/>
               <a:t>Click to edit Master title style</a:t>
             </a:r>
-            <a:endParaRPr lang="en-US"/>
           </a:p>
         </p:txBody>
       </p:sp>
@@ -2660,38 +2677,37 @@
           <a:p>
             <a:pPr lvl="0"/>
             <a:r>
-              <a:rPr lang="en-US" smtClean="0"/>
+              <a:rPr lang="en-US"/>
               <a:t>Click to edit Master text styles</a:t>
             </a:r>
           </a:p>
           <a:p>
             <a:pPr lvl="1"/>
             <a:r>
-              <a:rPr lang="en-US" smtClean="0"/>
+              <a:rPr lang="en-US"/>
               <a:t>Second level</a:t>
             </a:r>
           </a:p>
           <a:p>
             <a:pPr lvl="2"/>
             <a:r>
-              <a:rPr lang="en-US" smtClean="0"/>
+              <a:rPr lang="en-US"/>
               <a:t>Third level</a:t>
             </a:r>
           </a:p>
           <a:p>
             <a:pPr lvl="3"/>
             <a:r>
-              <a:rPr lang="en-US" smtClean="0"/>
+              <a:rPr lang="en-US"/>
               <a:t>Fourth level</a:t>
             </a:r>
           </a:p>
           <a:p>
             <a:pPr lvl="4"/>
             <a:r>
-              <a:rPr lang="en-US" smtClean="0"/>
+              <a:rPr lang="en-US"/>
               <a:t>Fifth level</a:t>
             </a:r>
-            <a:endParaRPr lang="en-US"/>
           </a:p>
         </p:txBody>
       </p:sp>
@@ -2730,7 +2746,7 @@
           <a:p>
             <a:fld id="{5BCAD085-E8A6-8845-BD4E-CB4CCA059FC4}" type="datetimeFigureOut">
               <a:rPr lang="en-US" smtClean="0"/>
-              <a:t>1/27/13</a:t>
+              <a:t>11/27/2020</a:t>
             </a:fld>
             <a:endParaRPr lang="en-US"/>
           </a:p>
@@ -2808,7 +2824,7 @@
           <a:p>
             <a:fld id="{C1FF6DA9-008F-8B48-92A6-B652298478BF}" type="slidenum">
               <a:rPr lang="en-US" smtClean="0"/>
-              <a:t>‹#›</a:t>
+              <a:t>‹N°›</a:t>
             </a:fld>
             <a:endParaRPr lang="en-US"/>
           </a:p>
@@ -3089,7 +3105,7 @@
 </file>
 
 <file path=ppt/slides/slide1.xml><?xml version="1.0" encoding="utf-8"?>
-<p:sld xmlns:a="http://schemas.openxmlformats.org/drawingml/2006/main" xmlns:p="http://schemas.openxmlformats.org/presentationml/2006/main" xmlns:r="http://schemas.openxmlformats.org/officeDocument/2006/relationships">
+<p:sld xmlns:a="http://schemas.openxmlformats.org/drawingml/2006/main" xmlns:r="http://schemas.openxmlformats.org/officeDocument/2006/relationships" xmlns:p="http://schemas.openxmlformats.org/presentationml/2006/main">
   <p:cSld>
     <p:spTree>
       <p:nvGrpSpPr>
@@ -3097,7 +3113,14 @@
         <p:cNvGrpSpPr/>
         <p:nvPr/>
       </p:nvGrpSpPr>
-      <p:grpSpPr/>
+      <p:grpSpPr>
+        <a:xfrm>
+          <a:off x="0" y="0"/>
+          <a:ext cx="0" cy="0"/>
+          <a:chOff x="0" y="0"/>
+          <a:chExt cx="0" cy="0"/>
+        </a:xfrm>
+      </p:grpSpPr>
       <p:sp>
         <p:nvSpPr>
           <p:cNvPr id="2" name="Title 1"/>
@@ -3149,7 +3172,7 @@
 </file>
 
 <file path=ppt/slides/slide10.xml><?xml version="1.0" encoding="utf-8"?>
-<p:sld xmlns:a="http://schemas.openxmlformats.org/drawingml/2006/main" xmlns:p="http://schemas.openxmlformats.org/presentationml/2006/main" xmlns:r="http://schemas.openxmlformats.org/officeDocument/2006/relationships">
+<p:sld xmlns:a="http://schemas.openxmlformats.org/drawingml/2006/main" xmlns:r="http://schemas.openxmlformats.org/officeDocument/2006/relationships" xmlns:p="http://schemas.openxmlformats.org/presentationml/2006/main">
   <p:cSld>
     <p:spTree>
       <p:nvGrpSpPr>
@@ -3157,7 +3180,14 @@
         <p:cNvGrpSpPr/>
         <p:nvPr/>
       </p:nvGrpSpPr>
-      <p:grpSpPr/>
+      <p:grpSpPr>
+        <a:xfrm>
+          <a:off x="0" y="0"/>
+          <a:ext cx="0" cy="0"/>
+          <a:chOff x="0" y="0"/>
+          <a:chExt cx="0" cy="0"/>
+        </a:xfrm>
+      </p:grpSpPr>
       <p:sp>
         <p:nvSpPr>
           <p:cNvPr id="2" name="Title 1"/>
@@ -3186,7 +3216,7 @@
             <a:spLocks noGrp="1"/>
           </p:cNvSpPr>
           <p:nvPr>
-            <p:ph type="body" idx="1" orient="vert"/>
+            <p:ph type="body" orient="vert" idx="1"/>
           </p:nvPr>
         </p:nvSpPr>
         <p:spPr/>
@@ -3209,7 +3239,7 @@
 </file>
 
 <file path=ppt/slides/slide11.xml><?xml version="1.0" encoding="utf-8"?>
-<p:sld xmlns:a="http://schemas.openxmlformats.org/drawingml/2006/main" xmlns:p="http://schemas.openxmlformats.org/presentationml/2006/main" xmlns:r="http://schemas.openxmlformats.org/officeDocument/2006/relationships">
+<p:sld xmlns:a="http://schemas.openxmlformats.org/drawingml/2006/main" xmlns:r="http://schemas.openxmlformats.org/officeDocument/2006/relationships" xmlns:p="http://schemas.openxmlformats.org/presentationml/2006/main">
   <p:cSld>
     <p:spTree>
       <p:nvGrpSpPr>
@@ -3217,7 +3247,14 @@
         <p:cNvGrpSpPr/>
         <p:nvPr/>
       </p:nvGrpSpPr>
-      <p:grpSpPr/>
+      <p:grpSpPr>
+        <a:xfrm>
+          <a:off x="0" y="0"/>
+          <a:ext cx="0" cy="0"/>
+          <a:chOff x="0" y="0"/>
+          <a:chExt cx="0" cy="0"/>
+        </a:xfrm>
+      </p:grpSpPr>
       <p:sp>
         <p:nvSpPr>
           <p:cNvPr id="2" name="Vertical Title 1"/>
@@ -3246,7 +3283,7 @@
             <a:spLocks noGrp="1"/>
           </p:cNvSpPr>
           <p:nvPr>
-            <p:ph type="body" idx="1" orient="vert"/>
+            <p:ph type="body" orient="vert" idx="1"/>
           </p:nvPr>
         </p:nvSpPr>
         <p:spPr/>
@@ -3269,7 +3306,7 @@
 </file>
 
 <file path=ppt/slides/slide2.xml><?xml version="1.0" encoding="utf-8"?>
-<p:sld xmlns:a="http://schemas.openxmlformats.org/drawingml/2006/main" xmlns:p="http://schemas.openxmlformats.org/presentationml/2006/main" xmlns:r="http://schemas.openxmlformats.org/officeDocument/2006/relationships">
+<p:sld xmlns:a="http://schemas.openxmlformats.org/drawingml/2006/main" xmlns:r="http://schemas.openxmlformats.org/officeDocument/2006/relationships" xmlns:p="http://schemas.openxmlformats.org/presentationml/2006/main">
   <p:cSld>
     <p:spTree>
       <p:nvGrpSpPr>
@@ -3277,7 +3314,14 @@
         <p:cNvGrpSpPr/>
         <p:nvPr/>
       </p:nvGrpSpPr>
-      <p:grpSpPr/>
+      <p:grpSpPr>
+        <a:xfrm>
+          <a:off x="0" y="0"/>
+          <a:ext cx="0" cy="0"/>
+          <a:chOff x="0" y="0"/>
+          <a:chExt cx="0" cy="0"/>
+        </a:xfrm>
+      </p:grpSpPr>
       <p:sp>
         <p:nvSpPr>
           <p:cNvPr id="2" name="Title 1"/>
@@ -3315,6 +3359,7 @@
           <a:lstStyle/>
           <a:p>
             <a:r>
+              <a:rPr dirty="0"/>
               <a:t>Content Placeholder 2 OBJECT (7)</a:t>
             </a:r>
           </a:p>
@@ -3329,7 +3374,7 @@
 </file>
 
 <file path=ppt/slides/slide3.xml><?xml version="1.0" encoding="utf-8"?>
-<p:sld xmlns:a="http://schemas.openxmlformats.org/drawingml/2006/main" xmlns:p="http://schemas.openxmlformats.org/presentationml/2006/main" xmlns:r="http://schemas.openxmlformats.org/officeDocument/2006/relationships">
+<p:sld xmlns:a="http://schemas.openxmlformats.org/drawingml/2006/main" xmlns:r="http://schemas.openxmlformats.org/officeDocument/2006/relationships" xmlns:p="http://schemas.openxmlformats.org/presentationml/2006/main">
   <p:cSld>
     <p:spTree>
       <p:nvGrpSpPr>
@@ -3337,7 +3382,14 @@
         <p:cNvGrpSpPr/>
         <p:nvPr/>
       </p:nvGrpSpPr>
-      <p:grpSpPr/>
+      <p:grpSpPr>
+        <a:xfrm>
+          <a:off x="0" y="0"/>
+          <a:ext cx="0" cy="0"/>
+          <a:chOff x="0" y="0"/>
+          <a:chExt cx="0" cy="0"/>
+        </a:xfrm>
+      </p:grpSpPr>
       <p:sp>
         <p:nvSpPr>
           <p:cNvPr id="2" name="Title 1"/>
@@ -3389,7 +3441,7 @@
 </file>
 
 <file path=ppt/slides/slide4.xml><?xml version="1.0" encoding="utf-8"?>
-<p:sld xmlns:a="http://schemas.openxmlformats.org/drawingml/2006/main" xmlns:p="http://schemas.openxmlformats.org/presentationml/2006/main" xmlns:r="http://schemas.openxmlformats.org/officeDocument/2006/relationships">
+<p:sld xmlns:a="http://schemas.openxmlformats.org/drawingml/2006/main" xmlns:r="http://schemas.openxmlformats.org/officeDocument/2006/relationships" xmlns:p="http://schemas.openxmlformats.org/presentationml/2006/main">
   <p:cSld>
     <p:spTree>
       <p:nvGrpSpPr>
@@ -3397,7 +3449,14 @@
         <p:cNvGrpSpPr/>
         <p:nvPr/>
       </p:nvGrpSpPr>
-      <p:grpSpPr/>
+      <p:grpSpPr>
+        <a:xfrm>
+          <a:off x="0" y="0"/>
+          <a:ext cx="0" cy="0"/>
+          <a:chOff x="0" y="0"/>
+          <a:chExt cx="0" cy="0"/>
+        </a:xfrm>
+      </p:grpSpPr>
       <p:sp>
         <p:nvSpPr>
           <p:cNvPr id="2" name="Title 1"/>
@@ -3414,6 +3473,7 @@
           <a:lstStyle/>
           <a:p>
             <a:r>
+              <a:rPr dirty="0"/>
               <a:t>TWO_CONTENT</a:t>
             </a:r>
           </a:p>
@@ -3426,15 +3486,16 @@
             <a:spLocks noGrp="1"/>
           </p:cNvSpPr>
           <p:nvPr>
-            <p:ph idx="1" sz="half"/>
-          </p:nvPr>
-        </p:nvSpPr>
-        <p:spPr/>
-        <p:txBody>
-          <a:bodyPr/>
-          <a:lstStyle/>
-          <a:p>
-            <a:r>
+            <p:ph sz="half" idx="1"/>
+          </p:nvPr>
+        </p:nvSpPr>
+        <p:spPr/>
+        <p:txBody>
+          <a:bodyPr/>
+          <a:lstStyle/>
+          <a:p>
+            <a:r>
+              <a:rPr dirty="0"/>
               <a:t>Content Placeholder 2 OBJECT (7)</a:t>
             </a:r>
           </a:p>
@@ -3447,15 +3508,16 @@
             <a:spLocks noGrp="1"/>
           </p:cNvSpPr>
           <p:nvPr>
-            <p:ph idx="2" sz="half"/>
-          </p:nvPr>
-        </p:nvSpPr>
-        <p:spPr/>
-        <p:txBody>
-          <a:bodyPr/>
-          <a:lstStyle/>
-          <a:p>
-            <a:r>
+            <p:ph sz="half" idx="2"/>
+          </p:nvPr>
+        </p:nvSpPr>
+        <p:spPr/>
+        <p:txBody>
+          <a:bodyPr/>
+          <a:lstStyle/>
+          <a:p>
+            <a:r>
+              <a:rPr dirty="0"/>
               <a:t>Content Placeholder 3 OBJECT (7)</a:t>
             </a:r>
           </a:p>
@@ -3470,7 +3532,7 @@
 </file>
 
 <file path=ppt/slides/slide5.xml><?xml version="1.0" encoding="utf-8"?>
-<p:sld xmlns:a="http://schemas.openxmlformats.org/drawingml/2006/main" xmlns:p="http://schemas.openxmlformats.org/presentationml/2006/main" xmlns:r="http://schemas.openxmlformats.org/officeDocument/2006/relationships">
+<p:sld xmlns:a="http://schemas.openxmlformats.org/drawingml/2006/main" xmlns:r="http://schemas.openxmlformats.org/officeDocument/2006/relationships" xmlns:p="http://schemas.openxmlformats.org/presentationml/2006/main">
   <p:cSld>
     <p:spTree>
       <p:nvGrpSpPr>
@@ -3478,7 +3540,14 @@
         <p:cNvGrpSpPr/>
         <p:nvPr/>
       </p:nvGrpSpPr>
-      <p:grpSpPr/>
+      <p:grpSpPr>
+        <a:xfrm>
+          <a:off x="0" y="0"/>
+          <a:ext cx="0" cy="0"/>
+          <a:chOff x="0" y="0"/>
+          <a:chExt cx="0" cy="0"/>
+        </a:xfrm>
+      </p:grpSpPr>
       <p:sp>
         <p:nvSpPr>
           <p:cNvPr id="2" name="Title 1"/>
@@ -3528,7 +3597,7 @@
             <a:spLocks noGrp="1"/>
           </p:cNvSpPr>
           <p:nvPr>
-            <p:ph idx="2" sz="half"/>
+            <p:ph sz="half" idx="2"/>
           </p:nvPr>
         </p:nvSpPr>
         <p:spPr/>
@@ -3549,7 +3618,7 @@
             <a:spLocks noGrp="1"/>
           </p:cNvSpPr>
           <p:nvPr>
-            <p:ph type="body" idx="3" sz="quarter"/>
+            <p:ph type="body" sz="quarter" idx="3"/>
           </p:nvPr>
         </p:nvSpPr>
         <p:spPr/>
@@ -3570,7 +3639,7 @@
             <a:spLocks noGrp="1"/>
           </p:cNvSpPr>
           <p:nvPr>
-            <p:ph idx="4" sz="quarter"/>
+            <p:ph sz="quarter" idx="4"/>
           </p:nvPr>
         </p:nvSpPr>
         <p:spPr/>
@@ -3593,7 +3662,7 @@
 </file>
 
 <file path=ppt/slides/slide6.xml><?xml version="1.0" encoding="utf-8"?>
-<p:sld xmlns:a="http://schemas.openxmlformats.org/drawingml/2006/main" xmlns:p="http://schemas.openxmlformats.org/presentationml/2006/main" xmlns:r="http://schemas.openxmlformats.org/officeDocument/2006/relationships">
+<p:sld xmlns:a="http://schemas.openxmlformats.org/drawingml/2006/main" xmlns:r="http://schemas.openxmlformats.org/officeDocument/2006/relationships" xmlns:p="http://schemas.openxmlformats.org/presentationml/2006/main">
   <p:cSld>
     <p:spTree>
       <p:nvGrpSpPr>
@@ -3601,7 +3670,14 @@
         <p:cNvGrpSpPr/>
         <p:nvPr/>
       </p:nvGrpSpPr>
-      <p:grpSpPr/>
+      <p:grpSpPr>
+        <a:xfrm>
+          <a:off x="0" y="0"/>
+          <a:ext cx="0" cy="0"/>
+          <a:chOff x="0" y="0"/>
+          <a:chExt cx="0" cy="0"/>
+        </a:xfrm>
+      </p:grpSpPr>
       <p:sp>
         <p:nvSpPr>
           <p:cNvPr id="2" name="Title 1"/>
@@ -3632,7 +3708,7 @@
 </file>
 
 <file path=ppt/slides/slide7.xml><?xml version="1.0" encoding="utf-8"?>
-<p:sld xmlns:a="http://schemas.openxmlformats.org/drawingml/2006/main" xmlns:p="http://schemas.openxmlformats.org/presentationml/2006/main" xmlns:r="http://schemas.openxmlformats.org/officeDocument/2006/relationships">
+<p:sld xmlns:a="http://schemas.openxmlformats.org/drawingml/2006/main" xmlns:r="http://schemas.openxmlformats.org/officeDocument/2006/relationships" xmlns:p="http://schemas.openxmlformats.org/presentationml/2006/main">
   <p:cSld>
     <p:spTree>
       <p:nvGrpSpPr>
@@ -3640,7 +3716,14 @@
         <p:cNvGrpSpPr/>
         <p:nvPr/>
       </p:nvGrpSpPr>
-      <p:grpSpPr/>
+      <p:grpSpPr>
+        <a:xfrm>
+          <a:off x="0" y="0"/>
+          <a:ext cx="0" cy="0"/>
+          <a:chOff x="0" y="0"/>
+          <a:chExt cx="0" cy="0"/>
+        </a:xfrm>
+      </p:grpSpPr>
       <p:sp>
         <p:nvSpPr>
           <p:cNvPr id="2" name="TextBox 1"/>
@@ -3784,8 +3867,20 @@
                 <a:tableStyleId>{5C22544A-7EE6-4342-B048-85BDC9FD1C3A}</a:tableStyleId>
               </a:tblPr>
               <a:tblGrid>
-                <a:gridCol w="1828800"/>
-                <a:gridCol w="3657600"/>
+                <a:gridCol w="1828800">
+                  <a:extLst>
+                    <a:ext uri="{9D8B030D-6E8A-4147-A177-3AD203B41FA5}">
+                      <a16:colId xmlns:a16="http://schemas.microsoft.com/office/drawing/2014/main" val="20000"/>
+                    </a:ext>
+                  </a:extLst>
+                </a:gridCol>
+                <a:gridCol w="3657600">
+                  <a:extLst>
+                    <a:ext uri="{9D8B030D-6E8A-4147-A177-3AD203B41FA5}">
+                      <a16:colId xmlns:a16="http://schemas.microsoft.com/office/drawing/2014/main" val="20001"/>
+                    </a:ext>
+                  </a:extLst>
+                </a:gridCol>
               </a:tblGrid>
               <a:tr h="365760">
                 <a:tc>
@@ -3812,6 +3907,11 @@
                   </a:txBody>
                   <a:tcPr/>
                 </a:tc>
+                <a:extLst>
+                  <a:ext uri="{0D108BD9-81ED-4DB2-BD59-A6C34878D82A}">
+                    <a16:rowId xmlns:a16="http://schemas.microsoft.com/office/drawing/2014/main" val="10000"/>
+                  </a:ext>
+                </a:extLst>
               </a:tr>
               <a:tr h="365760">
                 <a:tc>
@@ -3832,12 +3932,19 @@
                     <a:lstStyle/>
                     <a:p>
                       <a:r>
+                        <a:rPr dirty="0" err="1"/>
                         <a:t>Qux</a:t>
                       </a:r>
+                      <a:endParaRPr dirty="0"/>
                     </a:p>
                   </a:txBody>
                   <a:tcPr/>
                 </a:tc>
+                <a:extLst>
+                  <a:ext uri="{0D108BD9-81ED-4DB2-BD59-A6C34878D82A}">
+                    <a16:rowId xmlns:a16="http://schemas.microsoft.com/office/drawing/2014/main" val="10001"/>
+                  </a:ext>
+                </a:extLst>
               </a:tr>
             </a:tbl>
           </a:graphicData>
@@ -3852,7 +3959,7 @@
 </file>
 
 <file path=ppt/slides/slide8.xml><?xml version="1.0" encoding="utf-8"?>
-<p:sld xmlns:a="http://schemas.openxmlformats.org/drawingml/2006/main" xmlns:p="http://schemas.openxmlformats.org/presentationml/2006/main" xmlns:r="http://schemas.openxmlformats.org/officeDocument/2006/relationships">
+<p:sld xmlns:a="http://schemas.openxmlformats.org/drawingml/2006/main" xmlns:r="http://schemas.openxmlformats.org/officeDocument/2006/relationships" xmlns:p="http://schemas.openxmlformats.org/presentationml/2006/main">
   <p:cSld>
     <p:spTree>
       <p:nvGrpSpPr>
@@ -3860,7 +3967,14 @@
         <p:cNvGrpSpPr/>
         <p:nvPr/>
       </p:nvGrpSpPr>
-      <p:grpSpPr/>
+      <p:grpSpPr>
+        <a:xfrm>
+          <a:off x="0" y="0"/>
+          <a:ext cx="0" cy="0"/>
+          <a:chOff x="0" y="0"/>
+          <a:chExt cx="0" cy="0"/>
+        </a:xfrm>
+      </p:grpSpPr>
       <p:sp>
         <p:nvSpPr>
           <p:cNvPr id="2" name="Title 1"/>
@@ -3910,7 +4024,7 @@
             <a:spLocks noGrp="1"/>
           </p:cNvSpPr>
           <p:nvPr>
-            <p:ph type="body" idx="2" sz="half"/>
+            <p:ph type="body" sz="half" idx="2"/>
           </p:nvPr>
         </p:nvSpPr>
         <p:spPr/>
@@ -3933,7 +4047,7 @@
 </file>
 
 <file path=ppt/slides/slide9.xml><?xml version="1.0" encoding="utf-8"?>
-<p:sld xmlns:a="http://schemas.openxmlformats.org/drawingml/2006/main" xmlns:p="http://schemas.openxmlformats.org/presentationml/2006/main" xmlns:r="http://schemas.openxmlformats.org/officeDocument/2006/relationships">
+<p:sld xmlns:a="http://schemas.openxmlformats.org/drawingml/2006/main" xmlns:r="http://schemas.openxmlformats.org/officeDocument/2006/relationships" xmlns:p="http://schemas.openxmlformats.org/presentationml/2006/main">
   <p:cSld>
     <p:spTree>
       <p:nvGrpSpPr>
@@ -3941,7 +4055,14 @@
         <p:cNvGrpSpPr/>
         <p:nvPr/>
       </p:nvGrpSpPr>
-      <p:grpSpPr/>
+      <p:grpSpPr>
+        <a:xfrm>
+          <a:off x="0" y="0"/>
+          <a:ext cx="0" cy="0"/>
+          <a:chOff x="0" y="0"/>
+          <a:chExt cx="0" cy="0"/>
+        </a:xfrm>
+      </p:grpSpPr>
       <p:sp>
         <p:nvSpPr>
           <p:cNvPr id="2" name="Title 1"/>
@@ -3989,7 +4110,7 @@
             <a:spLocks noGrp="1"/>
           </p:cNvSpPr>
           <p:nvPr>
-            <p:ph type="body" idx="2" sz="half"/>
+            <p:ph type="body" sz="half" idx="2"/>
           </p:nvPr>
         </p:nvSpPr>
         <p:spPr/>

</xml_diff>

<commit_message>
added default picture exception + picture / content / vertical functions
</commit_message>
<xml_diff>
--- a/python-pptx/slide_layouts_placeholders.pptx
+++ b/python-pptx/slide_layouts_placeholders.pptx
@@ -136,6 +136,29 @@
 <file path=ppt/changesInfos/changesInfo1.xml><?xml version="1.0" encoding="utf-8"?>
 <pc:chgInfo xmlns:a="http://schemas.openxmlformats.org/drawingml/2006/main" xmlns:r="http://schemas.openxmlformats.org/officeDocument/2006/relationships" xmlns:ac="http://schemas.microsoft.com/office/drawing/2013/main/command" xmlns:pc="http://schemas.microsoft.com/office/powerpoint/2013/main/command">
   <pc:docChgLst>
+    <pc:chgData name="Jérémy TRULLIER" userId="6a7aa6db-e2f0-41b5-b206-e3597263f90b" providerId="ADAL" clId="{05A7F8A4-788B-496E-A74A-7086E0823206}"/>
+    <pc:docChg chg="addSld delSld">
+      <pc:chgData name="Jérémy TRULLIER" userId="6a7aa6db-e2f0-41b5-b206-e3597263f90b" providerId="ADAL" clId="{05A7F8A4-788B-496E-A74A-7086E0823206}" dt="2021-01-14T16:02:56.927" v="3" actId="47"/>
+      <pc:docMkLst>
+        <pc:docMk/>
+      </pc:docMkLst>
+      <pc:sldChg chg="new del">
+        <pc:chgData name="Jérémy TRULLIER" userId="6a7aa6db-e2f0-41b5-b206-e3597263f90b" providerId="ADAL" clId="{05A7F8A4-788B-496E-A74A-7086E0823206}" dt="2021-01-14T16:02:56.927" v="3" actId="47"/>
+        <pc:sldMkLst>
+          <pc:docMk/>
+          <pc:sldMk cId="967033224" sldId="267"/>
+        </pc:sldMkLst>
+      </pc:sldChg>
+      <pc:sldChg chg="new del">
+        <pc:chgData name="Jérémy TRULLIER" userId="6a7aa6db-e2f0-41b5-b206-e3597263f90b" providerId="ADAL" clId="{05A7F8A4-788B-496E-A74A-7086E0823206}" dt="2021-01-14T16:02:45.469" v="1" actId="47"/>
+        <pc:sldMkLst>
+          <pc:docMk/>
+          <pc:sldMk cId="1942005604" sldId="267"/>
+        </pc:sldMkLst>
+      </pc:sldChg>
+    </pc:docChg>
+  </pc:docChgLst>
+  <pc:docChgLst>
     <pc:chgData name="Jérémy TRULLIER" userId="6a7aa6db-e2f0-41b5-b206-e3597263f90b" providerId="ADAL" clId="{8D72BB26-AAAE-4C26-8995-4C4965390076}"/>
     <pc:docChg chg="undo custSel addSld delSld">
       <pc:chgData name="Jérémy TRULLIER" userId="6a7aa6db-e2f0-41b5-b206-e3597263f90b" providerId="ADAL" clId="{8D72BB26-AAAE-4C26-8995-4C4965390076}" dt="2020-11-27T13:11:24.108" v="1" actId="680"/>
@@ -333,7 +356,7 @@
           <a:p>
             <a:fld id="{5BCAD085-E8A6-8845-BD4E-CB4CCA059FC4}" type="datetimeFigureOut">
               <a:rPr lang="en-US" smtClean="0"/>
-              <a:t>11/27/2020</a:t>
+              <a:t>1/14/2021</a:t>
             </a:fld>
             <a:endParaRPr lang="en-US"/>
           </a:p>
@@ -501,7 +524,7 @@
           <a:p>
             <a:fld id="{5BCAD085-E8A6-8845-BD4E-CB4CCA059FC4}" type="datetimeFigureOut">
               <a:rPr lang="en-US" smtClean="0"/>
-              <a:t>11/27/2020</a:t>
+              <a:t>1/14/2021</a:t>
             </a:fld>
             <a:endParaRPr lang="en-US"/>
           </a:p>
@@ -679,7 +702,7 @@
           <a:p>
             <a:fld id="{5BCAD085-E8A6-8845-BD4E-CB4CCA059FC4}" type="datetimeFigureOut">
               <a:rPr lang="en-US" smtClean="0"/>
-              <a:t>11/27/2020</a:t>
+              <a:t>1/14/2021</a:t>
             </a:fld>
             <a:endParaRPr lang="en-US"/>
           </a:p>
@@ -847,7 +870,7 @@
           <a:p>
             <a:fld id="{5BCAD085-E8A6-8845-BD4E-CB4CCA059FC4}" type="datetimeFigureOut">
               <a:rPr lang="en-US" smtClean="0"/>
-              <a:t>11/27/2020</a:t>
+              <a:t>1/14/2021</a:t>
             </a:fld>
             <a:endParaRPr lang="en-US"/>
           </a:p>
@@ -1092,7 +1115,7 @@
           <a:p>
             <a:fld id="{5BCAD085-E8A6-8845-BD4E-CB4CCA059FC4}" type="datetimeFigureOut">
               <a:rPr lang="en-US" smtClean="0"/>
-              <a:t>11/27/2020</a:t>
+              <a:t>1/14/2021</a:t>
             </a:fld>
             <a:endParaRPr lang="en-US"/>
           </a:p>
@@ -1377,7 +1400,7 @@
           <a:p>
             <a:fld id="{5BCAD085-E8A6-8845-BD4E-CB4CCA059FC4}" type="datetimeFigureOut">
               <a:rPr lang="en-US" smtClean="0"/>
-              <a:t>11/27/2020</a:t>
+              <a:t>1/14/2021</a:t>
             </a:fld>
             <a:endParaRPr lang="en-US"/>
           </a:p>
@@ -1796,7 +1819,7 @@
           <a:p>
             <a:fld id="{5BCAD085-E8A6-8845-BD4E-CB4CCA059FC4}" type="datetimeFigureOut">
               <a:rPr lang="en-US" smtClean="0"/>
-              <a:t>11/27/2020</a:t>
+              <a:t>1/14/2021</a:t>
             </a:fld>
             <a:endParaRPr lang="en-US"/>
           </a:p>
@@ -1913,7 +1936,7 @@
           <a:p>
             <a:fld id="{5BCAD085-E8A6-8845-BD4E-CB4CCA059FC4}" type="datetimeFigureOut">
               <a:rPr lang="en-US" smtClean="0"/>
-              <a:t>11/27/2020</a:t>
+              <a:t>1/14/2021</a:t>
             </a:fld>
             <a:endParaRPr lang="en-US"/>
           </a:p>
@@ -2008,7 +2031,7 @@
           <a:p>
             <a:fld id="{5BCAD085-E8A6-8845-BD4E-CB4CCA059FC4}" type="datetimeFigureOut">
               <a:rPr lang="en-US" smtClean="0"/>
-              <a:t>11/27/2020</a:t>
+              <a:t>1/14/2021</a:t>
             </a:fld>
             <a:endParaRPr lang="en-US"/>
           </a:p>
@@ -2283,7 +2306,7 @@
           <a:p>
             <a:fld id="{5BCAD085-E8A6-8845-BD4E-CB4CCA059FC4}" type="datetimeFigureOut">
               <a:rPr lang="en-US" smtClean="0"/>
-              <a:t>11/27/2020</a:t>
+              <a:t>1/14/2021</a:t>
             </a:fld>
             <a:endParaRPr lang="en-US"/>
           </a:p>
@@ -2535,7 +2558,7 @@
           <a:p>
             <a:fld id="{5BCAD085-E8A6-8845-BD4E-CB4CCA059FC4}" type="datetimeFigureOut">
               <a:rPr lang="en-US" smtClean="0"/>
-              <a:t>11/27/2020</a:t>
+              <a:t>1/14/2021</a:t>
             </a:fld>
             <a:endParaRPr lang="en-US"/>
           </a:p>
@@ -2746,7 +2769,7 @@
           <a:p>
             <a:fld id="{5BCAD085-E8A6-8845-BD4E-CB4CCA059FC4}" type="datetimeFigureOut">
               <a:rPr lang="en-US" smtClean="0"/>
-              <a:t>11/27/2020</a:t>
+              <a:t>1/14/2021</a:t>
             </a:fld>
             <a:endParaRPr lang="en-US"/>
           </a:p>

</xml_diff>